<commit_message>
Präsentation folie 2 zeichen und rechtschreibfehler korrigiert
</commit_message>
<xml_diff>
--- a/Pflichtenheft/Pflichtenheft Präsentation.pptx
+++ b/Pflichtenheft/Pflichtenheft Präsentation.pptx
@@ -123,6 +123,22 @@
       </a:defRPr>
     </a:lvl9pPr>
   </p:defaultTextStyle>
+  <p:extLst>
+    <p:ext uri="{EFAFB233-063F-42B5-8137-9DF3F51BA10A}">
+      <p15:sldGuideLst xmlns:p15="http://schemas.microsoft.com/office/powerpoint/2012/main">
+        <p15:guide id="1" orient="horz" pos="2160">
+          <p15:clr>
+            <a:srgbClr val="A4A3A4"/>
+          </p15:clr>
+        </p15:guide>
+        <p15:guide id="2" pos="2880">
+          <p15:clr>
+            <a:srgbClr val="A4A3A4"/>
+          </p15:clr>
+        </p15:guide>
+      </p15:sldGuideLst>
+    </p:ext>
+  </p:extLst>
 </p:presentation>
 </file>
 
@@ -367,7 +383,7 @@
           <a:p>
             <a:fld id="{A4868141-CDDC-4A04-81A7-AFE2BB317C4D}" type="slidenum">
               <a:rPr lang="de-DE" smtClean="0"/>
-              <a:t>‹#›</a:t>
+              <a:t>‹Nr.›</a:t>
             </a:fld>
             <a:endParaRPr lang="de-DE"/>
           </a:p>
@@ -783,7 +799,7 @@
           <a:p>
             <a:fld id="{0983C68D-D4A7-45D7-81FB-9D23F2FA23A5}" type="slidenum">
               <a:rPr lang="de-DE" smtClean="0"/>
-              <a:t>‹#›</a:t>
+              <a:t>‹Nr.›</a:t>
             </a:fld>
             <a:endParaRPr lang="de-DE"/>
           </a:p>
@@ -953,7 +969,7 @@
           <a:p>
             <a:fld id="{0983C68D-D4A7-45D7-81FB-9D23F2FA23A5}" type="slidenum">
               <a:rPr lang="de-DE" smtClean="0"/>
-              <a:t>‹#›</a:t>
+              <a:t>‹Nr.›</a:t>
             </a:fld>
             <a:endParaRPr lang="de-DE"/>
           </a:p>
@@ -1133,7 +1149,7 @@
           <a:p>
             <a:fld id="{0983C68D-D4A7-45D7-81FB-9D23F2FA23A5}" type="slidenum">
               <a:rPr lang="de-DE" smtClean="0"/>
-              <a:t>‹#›</a:t>
+              <a:t>‹Nr.›</a:t>
             </a:fld>
             <a:endParaRPr lang="de-DE"/>
           </a:p>
@@ -1303,7 +1319,7 @@
           <a:p>
             <a:fld id="{0983C68D-D4A7-45D7-81FB-9D23F2FA23A5}" type="slidenum">
               <a:rPr lang="de-DE" smtClean="0"/>
-              <a:t>‹#›</a:t>
+              <a:t>‹Nr.›</a:t>
             </a:fld>
             <a:endParaRPr lang="de-DE"/>
           </a:p>
@@ -1549,7 +1565,7 @@
           <a:p>
             <a:fld id="{0983C68D-D4A7-45D7-81FB-9D23F2FA23A5}" type="slidenum">
               <a:rPr lang="de-DE" smtClean="0"/>
-              <a:t>‹#›</a:t>
+              <a:t>‹Nr.›</a:t>
             </a:fld>
             <a:endParaRPr lang="de-DE"/>
           </a:p>
@@ -1837,7 +1853,7 @@
           <a:p>
             <a:fld id="{0983C68D-D4A7-45D7-81FB-9D23F2FA23A5}" type="slidenum">
               <a:rPr lang="de-DE" smtClean="0"/>
-              <a:t>‹#›</a:t>
+              <a:t>‹Nr.›</a:t>
             </a:fld>
             <a:endParaRPr lang="de-DE"/>
           </a:p>
@@ -2259,7 +2275,7 @@
           <a:p>
             <a:fld id="{0983C68D-D4A7-45D7-81FB-9D23F2FA23A5}" type="slidenum">
               <a:rPr lang="de-DE" smtClean="0"/>
-              <a:t>‹#›</a:t>
+              <a:t>‹Nr.›</a:t>
             </a:fld>
             <a:endParaRPr lang="de-DE"/>
           </a:p>
@@ -2377,7 +2393,7 @@
           <a:p>
             <a:fld id="{0983C68D-D4A7-45D7-81FB-9D23F2FA23A5}" type="slidenum">
               <a:rPr lang="de-DE" smtClean="0"/>
-              <a:t>‹#›</a:t>
+              <a:t>‹Nr.›</a:t>
             </a:fld>
             <a:endParaRPr lang="de-DE"/>
           </a:p>
@@ -2472,7 +2488,7 @@
           <a:p>
             <a:fld id="{0983C68D-D4A7-45D7-81FB-9D23F2FA23A5}" type="slidenum">
               <a:rPr lang="de-DE" smtClean="0"/>
-              <a:t>‹#›</a:t>
+              <a:t>‹Nr.›</a:t>
             </a:fld>
             <a:endParaRPr lang="de-DE"/>
           </a:p>
@@ -2749,7 +2765,7 @@
           <a:p>
             <a:fld id="{0983C68D-D4A7-45D7-81FB-9D23F2FA23A5}" type="slidenum">
               <a:rPr lang="de-DE" smtClean="0"/>
-              <a:t>‹#›</a:t>
+              <a:t>‹Nr.›</a:t>
             </a:fld>
             <a:endParaRPr lang="de-DE"/>
           </a:p>
@@ -3002,7 +3018,7 @@
           <a:p>
             <a:fld id="{0983C68D-D4A7-45D7-81FB-9D23F2FA23A5}" type="slidenum">
               <a:rPr lang="de-DE" smtClean="0"/>
-              <a:t>‹#›</a:t>
+              <a:t>‹Nr.›</a:t>
             </a:fld>
             <a:endParaRPr lang="de-DE"/>
           </a:p>
@@ -3251,7 +3267,7 @@
           <a:p>
             <a:fld id="{0983C68D-D4A7-45D7-81FB-9D23F2FA23A5}" type="slidenum">
               <a:rPr lang="de-DE" smtClean="0"/>
-              <a:t>‹#›</a:t>
+              <a:t>‹Nr.›</a:t>
             </a:fld>
             <a:endParaRPr lang="de-DE"/>
           </a:p>
@@ -6022,7 +6038,15 @@
           <a:p>
             <a:r>
               <a:rPr lang="de-DE" sz="2800" dirty="0" smtClean="0"/>
-              <a:t>Aufgabe : Software entwerfen/entwickeln um Sensordaten auf einen FROST-Server zu laden</a:t>
+              <a:t>Aufgabe : Software </a:t>
+            </a:r>
+            <a:r>
+              <a:rPr lang="de-DE" sz="2800" dirty="0" smtClean="0"/>
+              <a:t>entwerfen/entwickeln, </a:t>
+            </a:r>
+            <a:r>
+              <a:rPr lang="de-DE" sz="2800" dirty="0" smtClean="0"/>
+              <a:t>um Sensordaten auf einen FROST-Server zu laden</a:t>
             </a:r>
           </a:p>
           <a:p>
@@ -6034,7 +6058,19 @@
           <a:p>
             <a:r>
               <a:rPr lang="de-DE" sz="2800" dirty="0" smtClean="0"/>
-              <a:t>Priorität : Benutzbarkeit, Software soll vor allem leicht zu bedienen sein, selbst ohne technischem Vorwissen</a:t>
+              <a:t>Priorität : Benutzbarkeit, Software soll vor allem leicht zu bedienen sein, selbst </a:t>
+            </a:r>
+            <a:r>
+              <a:rPr lang="de-DE" sz="2800" smtClean="0"/>
+              <a:t>ohne </a:t>
+            </a:r>
+            <a:r>
+              <a:rPr lang="de-DE" sz="2800" smtClean="0"/>
+              <a:t>technisches </a:t>
+            </a:r>
+            <a:r>
+              <a:rPr lang="de-DE" sz="2800" dirty="0" smtClean="0"/>
+              <a:t>Vorwissen</a:t>
             </a:r>
             <a:endParaRPr lang="de-DE" sz="2800" dirty="0"/>
           </a:p>

</xml_diff>